<commit_message>
Clean up DG diagrams and add in current implementation for polymorphic cards and storage
</commit_message>
<xml_diff>
--- a/docs/diagrams/WhiteBlackDiagrams/ArchitectureDiagram.pptx
+++ b/docs/diagrams/WhiteBlackDiagrams/ArchitectureDiagram.pptx
@@ -4480,7 +4480,7 @@
           </p:nvCxnSpPr>
           <p:spPr>
             <a:xfrm rot="13867188">
-              <a:off x="2743200" y="3755022"/>
+              <a:off x="2866091" y="3682554"/>
               <a:ext cx="0" cy="381000"/>
             </a:xfrm>
             <a:prstGeom prst="straightConnector1">
@@ -4517,7 +4517,7 @@
           </p:nvCxnSpPr>
           <p:spPr>
             <a:xfrm flipV="1">
-              <a:off x="2353734" y="3697061"/>
+              <a:off x="2353734" y="3669224"/>
               <a:ext cx="0" cy="301859"/>
             </a:xfrm>
             <a:prstGeom prst="straightConnector1">

</xml_diff>